<commit_message>
Modify PycamAdjust code comment
</commit_message>
<xml_diff>
--- a/Lecture/[02[OpenCVCoBan.pptx
+++ b/Lecture/[02[OpenCVCoBan.pptx
@@ -236,7 +236,7 @@
           <a:p>
             <a:fld id="{6B0060CE-5BE9-4999-A479-5CC727D9E929}" type="datetimeFigureOut">
               <a:rPr lang="en-US" smtClean="0"/>
-              <a:t>3/18/2020</a:t>
+              <a:t>5/6/2020</a:t>
             </a:fld>
             <a:endParaRPr lang="en-US"/>
           </a:p>
@@ -743,7 +743,7 @@
           <a:p>
             <a:fld id="{398F67C6-969B-4601-8D1D-2A5CCB604380}" type="datetimeFigureOut">
               <a:rPr lang="en-US" smtClean="0"/>
-              <a:t>3/18/2020</a:t>
+              <a:t>5/6/2020</a:t>
             </a:fld>
             <a:endParaRPr lang="en-US"/>
           </a:p>
@@ -941,7 +941,7 @@
           <a:p>
             <a:fld id="{398F67C6-969B-4601-8D1D-2A5CCB604380}" type="datetimeFigureOut">
               <a:rPr lang="en-US" smtClean="0"/>
-              <a:t>3/18/2020</a:t>
+              <a:t>5/6/2020</a:t>
             </a:fld>
             <a:endParaRPr lang="en-US"/>
           </a:p>
@@ -1149,7 +1149,7 @@
           <a:p>
             <a:fld id="{398F67C6-969B-4601-8D1D-2A5CCB604380}" type="datetimeFigureOut">
               <a:rPr lang="en-US" smtClean="0"/>
-              <a:t>3/18/2020</a:t>
+              <a:t>5/6/2020</a:t>
             </a:fld>
             <a:endParaRPr lang="en-US"/>
           </a:p>
@@ -1347,7 +1347,7 @@
           <a:p>
             <a:fld id="{398F67C6-969B-4601-8D1D-2A5CCB604380}" type="datetimeFigureOut">
               <a:rPr lang="en-US" smtClean="0"/>
-              <a:t>3/18/2020</a:t>
+              <a:t>5/6/2020</a:t>
             </a:fld>
             <a:endParaRPr lang="en-US"/>
           </a:p>
@@ -1622,7 +1622,7 @@
           <a:p>
             <a:fld id="{398F67C6-969B-4601-8D1D-2A5CCB604380}" type="datetimeFigureOut">
               <a:rPr lang="en-US" smtClean="0"/>
-              <a:t>3/18/2020</a:t>
+              <a:t>5/6/2020</a:t>
             </a:fld>
             <a:endParaRPr lang="en-US"/>
           </a:p>
@@ -1887,7 +1887,7 @@
           <a:p>
             <a:fld id="{398F67C6-969B-4601-8D1D-2A5CCB604380}" type="datetimeFigureOut">
               <a:rPr lang="en-US" smtClean="0"/>
-              <a:t>3/18/2020</a:t>
+              <a:t>5/6/2020</a:t>
             </a:fld>
             <a:endParaRPr lang="en-US"/>
           </a:p>
@@ -2299,7 +2299,7 @@
           <a:p>
             <a:fld id="{398F67C6-969B-4601-8D1D-2A5CCB604380}" type="datetimeFigureOut">
               <a:rPr lang="en-US" smtClean="0"/>
-              <a:t>3/18/2020</a:t>
+              <a:t>5/6/2020</a:t>
             </a:fld>
             <a:endParaRPr lang="en-US"/>
           </a:p>
@@ -2440,7 +2440,7 @@
           <a:p>
             <a:fld id="{398F67C6-969B-4601-8D1D-2A5CCB604380}" type="datetimeFigureOut">
               <a:rPr lang="en-US" smtClean="0"/>
-              <a:t>3/18/2020</a:t>
+              <a:t>5/6/2020</a:t>
             </a:fld>
             <a:endParaRPr lang="en-US"/>
           </a:p>
@@ -2553,7 +2553,7 @@
           <a:p>
             <a:fld id="{398F67C6-969B-4601-8D1D-2A5CCB604380}" type="datetimeFigureOut">
               <a:rPr lang="en-US" smtClean="0"/>
-              <a:t>3/18/2020</a:t>
+              <a:t>5/6/2020</a:t>
             </a:fld>
             <a:endParaRPr lang="en-US"/>
           </a:p>
@@ -2864,7 +2864,7 @@
           <a:p>
             <a:fld id="{398F67C6-969B-4601-8D1D-2A5CCB604380}" type="datetimeFigureOut">
               <a:rPr lang="en-US" smtClean="0"/>
-              <a:t>3/18/2020</a:t>
+              <a:t>5/6/2020</a:t>
             </a:fld>
             <a:endParaRPr lang="en-US"/>
           </a:p>
@@ -3152,7 +3152,7 @@
           <a:p>
             <a:fld id="{398F67C6-969B-4601-8D1D-2A5CCB604380}" type="datetimeFigureOut">
               <a:rPr lang="en-US" smtClean="0"/>
-              <a:t>3/18/2020</a:t>
+              <a:t>5/6/2020</a:t>
             </a:fld>
             <a:endParaRPr lang="en-US"/>
           </a:p>
@@ -3393,7 +3393,7 @@
           <a:p>
             <a:fld id="{398F67C6-969B-4601-8D1D-2A5CCB604380}" type="datetimeFigureOut">
               <a:rPr lang="en-US" smtClean="0"/>
-              <a:t>3/18/2020</a:t>
+              <a:t>5/6/2020</a:t>
             </a:fld>
             <a:endParaRPr lang="en-US"/>
           </a:p>
@@ -10451,13 +10451,8 @@
             </a:r>
             <a:r>
               <a:rPr lang="en-US" dirty="0"/>
-              <a:t> Fore ground </a:t>
-            </a:r>
-            <a:r>
-              <a:rPr lang="en-US" dirty="0" err="1"/>
-              <a:t>imgae</a:t>
-            </a:r>
-            <a:endParaRPr lang="en-US" dirty="0"/>
+              <a:t> Fore ground image</a:t>
+            </a:r>
           </a:p>
           <a:p>
             <a:r>
@@ -14467,6 +14462,15 @@
 </file>
 
 <file path=customXml/item1.xml><?xml version="1.0" encoding="utf-8"?>
+<?mso-contentType ?>
+<FormTemplates xmlns="http://schemas.microsoft.com/sharepoint/v3/contenttype/forms">
+  <Display>DocumentLibraryForm</Display>
+  <Edit>DocumentLibraryForm</Edit>
+  <New>DocumentLibraryForm</New>
+</FormTemplates>
+</file>
+
+<file path=customXml/item2.xml><?xml version="1.0" encoding="utf-8"?>
 <ct:contentTypeSchema xmlns:ct="http://schemas.microsoft.com/office/2006/metadata/contentType" xmlns:ma="http://schemas.microsoft.com/office/2006/metadata/properties/metaAttributes" ct:_="" ma:_="" ma:contentTypeName="Document" ma:contentTypeID="0x0101005BD551F90032B749B36C3DC190CEF30E" ma:contentTypeVersion="8" ma:contentTypeDescription="Create a new document." ma:contentTypeScope="" ma:versionID="f221cd154926e81e7cd0834e7580ba27">
   <xsd:schema xmlns:xsd="http://www.w3.org/2001/XMLSchema" xmlns:xs="http://www.w3.org/2001/XMLSchema" xmlns:p="http://schemas.microsoft.com/office/2006/metadata/properties" xmlns:ns3="b5dec6d1-ff35-47a2-b92b-72c1e009ebcf" targetNamespace="http://schemas.microsoft.com/office/2006/metadata/properties" ma:root="true" ma:fieldsID="662bb24b3b212a99191018b91831956a" ns3:_="">
     <xsd:import namespace="b5dec6d1-ff35-47a2-b92b-72c1e009ebcf"/>
@@ -14636,22 +14640,21 @@
 </ct:contentTypeSchema>
 </file>
 
-<file path=customXml/item2.xml><?xml version="1.0" encoding="utf-8"?>
+<file path=customXml/item3.xml><?xml version="1.0" encoding="utf-8"?>
 <p:properties xmlns:p="http://schemas.microsoft.com/office/2006/metadata/properties" xmlns:xsi="http://www.w3.org/2001/XMLSchema-instance" xmlns:pc="http://schemas.microsoft.com/office/infopath/2007/PartnerControls">
   <documentManagement/>
 </p:properties>
 </file>
 
-<file path=customXml/item3.xml><?xml version="1.0" encoding="utf-8"?>
-<?mso-contentType ?>
-<FormTemplates xmlns="http://schemas.microsoft.com/sharepoint/v3/contenttype/forms">
-  <Display>DocumentLibraryForm</Display>
-  <Edit>DocumentLibraryForm</Edit>
-  <New>DocumentLibraryForm</New>
-</FormTemplates>
+<file path=customXml/itemProps1.xml><?xml version="1.0" encoding="utf-8"?>
+<ds:datastoreItem xmlns:ds="http://schemas.openxmlformats.org/officeDocument/2006/customXml" ds:itemID="{367D404D-C7F6-4D08-AA47-E3794D297A9E}">
+  <ds:schemaRefs>
+    <ds:schemaRef ds:uri="http://schemas.microsoft.com/sharepoint/v3/contenttype/forms"/>
+  </ds:schemaRefs>
+</ds:datastoreItem>
 </file>
 
-<file path=customXml/itemProps1.xml><?xml version="1.0" encoding="utf-8"?>
+<file path=customXml/itemProps2.xml><?xml version="1.0" encoding="utf-8"?>
 <ds:datastoreItem xmlns:ds="http://schemas.openxmlformats.org/officeDocument/2006/customXml" ds:itemID="{165E9803-73E2-42B8-8A79-6ED09C462EBF}">
   <ds:schemaRefs>
     <ds:schemaRef ds:uri="http://schemas.microsoft.com/office/2006/metadata/contentType"/>
@@ -14669,19 +14672,11 @@
 </ds:datastoreItem>
 </file>
 
-<file path=customXml/itemProps2.xml><?xml version="1.0" encoding="utf-8"?>
+<file path=customXml/itemProps3.xml><?xml version="1.0" encoding="utf-8"?>
 <ds:datastoreItem xmlns:ds="http://schemas.openxmlformats.org/officeDocument/2006/customXml" ds:itemID="{5D02053A-F17C-4255-9994-667A92805C4B}">
   <ds:schemaRefs>
     <ds:schemaRef ds:uri="http://schemas.microsoft.com/office/2006/metadata/properties"/>
     <ds:schemaRef ds:uri="http://schemas.microsoft.com/office/infopath/2007/PartnerControls"/>
   </ds:schemaRefs>
 </ds:datastoreItem>
-</file>
-
-<file path=customXml/itemProps3.xml><?xml version="1.0" encoding="utf-8"?>
-<ds:datastoreItem xmlns:ds="http://schemas.openxmlformats.org/officeDocument/2006/customXml" ds:itemID="{367D404D-C7F6-4D08-AA47-E3794D297A9E}">
-  <ds:schemaRefs>
-    <ds:schemaRef ds:uri="http://schemas.microsoft.com/sharepoint/v3/contenttype/forms"/>
-  </ds:schemaRefs>
-</ds:datastoreItem>
 </file>
</xml_diff>